<commit_message>
Update Presentasi Weekly Test1 - Muhamad Sholihin.pptx
</commit_message>
<xml_diff>
--- a/Week1/02/Presentasi Weekly Test1 - Muhamad Sholihin.pptx
+++ b/Week1/02/Presentasi Weekly Test1 - Muhamad Sholihin.pptx
@@ -18,6 +18,7 @@
     <p:sldId id="262" r:id="rId12"/>
     <p:sldId id="263" r:id="rId13"/>
     <p:sldId id="268" r:id="rId14"/>
+    <p:sldId id="269" r:id="rId15"/>
   </p:sldIdLst>
   <p:sldSz cx="12192000" cy="6858000"/>
   <p:notesSz cx="6858000" cy="9144000"/>
@@ -3980,6 +3981,72 @@
 </p:sld>
 </file>
 
+<file path=ppt/slides/slide14.xml><?xml version="1.0" encoding="utf-8"?>
+<p:sld xmlns:a="http://schemas.openxmlformats.org/drawingml/2006/main" xmlns:r="http://schemas.openxmlformats.org/officeDocument/2006/relationships" xmlns:p="http://schemas.openxmlformats.org/presentationml/2006/main">
+  <p:cSld>
+    <p:spTree>
+      <p:nvGrpSpPr>
+        <p:cNvPr id="1" name=""/>
+        <p:cNvGrpSpPr/>
+        <p:nvPr/>
+      </p:nvGrpSpPr>
+      <p:grpSpPr>
+        <a:xfrm>
+          <a:off x="0" y="0"/>
+          <a:ext cx="0" cy="0"/>
+          <a:chOff x="0" y="0"/>
+          <a:chExt cx="0" cy="0"/>
+        </a:xfrm>
+      </p:grpSpPr>
+      <p:sp>
+        <p:nvSpPr>
+          <p:cNvPr id="2" name="Title 1">
+            <a:extLst>
+              <a:ext uri="{FF2B5EF4-FFF2-40B4-BE49-F238E27FC236}">
+                <a16:creationId xmlns:a16="http://schemas.microsoft.com/office/drawing/2014/main" id="{BA96E975-6639-4369-BDCA-083570E21FD8}"/>
+              </a:ext>
+            </a:extLst>
+          </p:cNvPr>
+          <p:cNvSpPr>
+            <a:spLocks noGrp="1"/>
+          </p:cNvSpPr>
+          <p:nvPr>
+            <p:ph type="ctrTitle"/>
+          </p:nvPr>
+        </p:nvSpPr>
+        <p:spPr/>
+        <p:txBody>
+          <a:bodyPr/>
+          <a:lstStyle/>
+          <a:p>
+            <a:pPr algn="ctr"/>
+            <a:r>
+              <a:rPr lang="en-ID" dirty="0"/>
+              <a:t>Thank You </a:t>
+            </a:r>
+            <a:r>
+              <a:rPr lang="en-ID" dirty="0">
+                <a:sym typeface="Wingdings" panose="05000000000000000000" pitchFamily="2" charset="2"/>
+              </a:rPr>
+              <a:t></a:t>
+            </a:r>
+            <a:endParaRPr lang="en-ID" dirty="0"/>
+          </a:p>
+        </p:txBody>
+      </p:sp>
+    </p:spTree>
+    <p:extLst>
+      <p:ext uri="{BB962C8B-B14F-4D97-AF65-F5344CB8AC3E}">
+        <p14:creationId xmlns:p14="http://schemas.microsoft.com/office/powerpoint/2010/main" val="3136343315"/>
+      </p:ext>
+    </p:extLst>
+  </p:cSld>
+  <p:clrMapOvr>
+    <a:masterClrMapping/>
+  </p:clrMapOvr>
+</p:sld>
+</file>
+
 <file path=ppt/slides/slide2.xml><?xml version="1.0" encoding="utf-8"?>
 <p:sld xmlns:a="http://schemas.openxmlformats.org/drawingml/2006/main" xmlns:r="http://schemas.openxmlformats.org/officeDocument/2006/relationships" xmlns:p="http://schemas.openxmlformats.org/presentationml/2006/main">
   <p:cSld>

</xml_diff>